<commit_message>
Your commit message here
</commit_message>
<xml_diff>
--- a/final_pres_st20243835.pptx
+++ b/final_pres_st20243835.pptx
@@ -16805,8 +16805,8 @@
         </p:nvSpPr>
         <p:spPr>
           <a:xfrm>
-            <a:off x="5750679" y="3360362"/>
-            <a:ext cx="5180938" cy="732867"/>
+            <a:off x="5455920" y="3360420"/>
+            <a:ext cx="5974715" cy="732790"/>
           </a:xfrm>
           <a:prstGeom prst="rect">
             <a:avLst/>
@@ -16836,6 +16836,10 @@
             </a:lvl1pPr>
           </a:lstStyle>
           <a:p>
+            <a:r>
+              <a:rPr lang="en-US" sz="1800" b="1" dirty="0"/>
+              <a:t>https://github.com/Thavakethan/Medical_Solution_System.git</a:t>
+            </a:r>
             <a:endParaRPr lang="en-US" sz="1800" b="1" dirty="0"/>
           </a:p>
         </p:txBody>
@@ -16863,49 +16867,8 @@
         </p:blipFill>
         <p:spPr bwMode="auto">
           <a:xfrm>
-            <a:off x="5330901" y="3497638"/>
+            <a:off x="4733366" y="3253798"/>
             <a:ext cx="839557" cy="839557"/>
-          </a:xfrm>
-          <a:prstGeom prst="rect">
-            <a:avLst/>
-          </a:prstGeom>
-          <a:noFill/>
-          <a:extLst>
-            <a:ext uri="{909E8E84-426E-40DD-AFC4-6F175D3DCCD1}">
-              <a14:hiddenFill xmlns:a14="http://schemas.microsoft.com/office/drawing/2010/main">
-                <a:solidFill>
-                  <a:srgbClr val="FFFFFF"/>
-                </a:solidFill>
-              </a14:hiddenFill>
-            </a:ext>
-          </a:extLst>
-        </p:spPr>
-      </p:pic>
-      <p:pic>
-        <p:nvPicPr>
-          <p:cNvPr id="2054" name="Picture 6"/>
-          <p:cNvPicPr>
-            <a:picLocks noChangeAspect="1" noChangeArrowheads="1"/>
-          </p:cNvPicPr>
-          <p:nvPr/>
-        </p:nvPicPr>
-        <p:blipFill>
-          <a:blip r:embed="rId3">
-            <a:extLst>
-              <a:ext uri="{28A0092B-C50C-407E-A947-70E740481C1C}">
-                <a14:useLocalDpi xmlns:a14="http://schemas.microsoft.com/office/drawing/2010/main" val="0"/>
-              </a:ext>
-            </a:extLst>
-          </a:blip>
-          <a:srcRect/>
-          <a:stretch>
-            <a:fillRect/>
-          </a:stretch>
-        </p:blipFill>
-        <p:spPr bwMode="auto">
-          <a:xfrm>
-            <a:off x="5455780" y="4298860"/>
-            <a:ext cx="732868" cy="732868"/>
           </a:xfrm>
           <a:prstGeom prst="rect">
             <a:avLst/>

</xml_diff>